<commit_message>
update presentation to match report, hid V2
</commit_message>
<xml_diff>
--- a/Reports/Past_Files/Final Presentation.pptx
+++ b/Reports/Past_Files/Final Presentation.pptx
@@ -235,7 +235,7 @@
           <a:p>
             <a:fld id="{D4B263E3-8777-476D-98B0-64C935BB88F3}" type="datetimeFigureOut">
               <a:rPr lang="en-US" smtClean="0"/>
-              <a:t>3/31/2020</a:t>
+              <a:t>4/18/2020</a:t>
             </a:fld>
             <a:endParaRPr lang="en-US"/>
           </a:p>
@@ -413,7 +413,7 @@
           <a:p>
             <a:fld id="{245D335A-29BB-46EE-A7B5-F0278504DBEE}" type="datetimeFigureOut">
               <a:rPr lang="en-US" smtClean="0"/>
-              <a:t>3/31/2020</a:t>
+              <a:t>4/18/2020</a:t>
             </a:fld>
             <a:endParaRPr lang="en-US"/>
           </a:p>
@@ -828,7 +828,7 @@
           <a:p>
             <a:fld id="{F5931C8F-8978-4DE2-AF7E-CB5D3E0EB295}" type="datetime1">
               <a:rPr lang="en-US" smtClean="0"/>
-              <a:t>3/31/2020</a:t>
+              <a:t>4/18/2020</a:t>
             </a:fld>
             <a:endParaRPr lang="en-US"/>
           </a:p>
@@ -1026,7 +1026,7 @@
           <a:p>
             <a:fld id="{F1EB1B9B-721C-4266-BD51-150A6A14889A}" type="datetime1">
               <a:rPr lang="en-US" smtClean="0"/>
-              <a:t>3/31/2020</a:t>
+              <a:t>4/18/2020</a:t>
             </a:fld>
             <a:endParaRPr lang="en-US"/>
           </a:p>
@@ -1234,7 +1234,7 @@
           <a:p>
             <a:fld id="{8DCC2D43-DF9A-47A7-A88C-A653F2EB18E7}" type="datetime1">
               <a:rPr lang="en-US" smtClean="0"/>
-              <a:t>3/31/2020</a:t>
+              <a:t>4/18/2020</a:t>
             </a:fld>
             <a:endParaRPr lang="en-US"/>
           </a:p>
@@ -1432,7 +1432,7 @@
           <a:p>
             <a:fld id="{6DA527B2-3190-4FF3-955F-B0C49C722EEA}" type="datetime1">
               <a:rPr lang="en-US" smtClean="0"/>
-              <a:t>3/31/2020</a:t>
+              <a:t>4/18/2020</a:t>
             </a:fld>
             <a:endParaRPr lang="en-US"/>
           </a:p>
@@ -1630,7 +1630,7 @@
           <a:p>
             <a:fld id="{7C778A92-F2E4-499D-B949-B5A1681C60AB}" type="datetime1">
               <a:rPr lang="en-US" smtClean="0"/>
-              <a:t>3/31/2020</a:t>
+              <a:t>4/18/2020</a:t>
             </a:fld>
             <a:endParaRPr lang="en-US"/>
           </a:p>
@@ -1905,7 +1905,7 @@
           <a:p>
             <a:fld id="{DBA8C8C1-0DAB-448A-A1F8-2A252D05F80A}" type="datetime1">
               <a:rPr lang="en-US" smtClean="0"/>
-              <a:t>3/31/2020</a:t>
+              <a:t>4/18/2020</a:t>
             </a:fld>
             <a:endParaRPr lang="en-US"/>
           </a:p>
@@ -2170,7 +2170,7 @@
           <a:p>
             <a:fld id="{4A60C80B-8078-4013-9B0B-772C3CCE03F6}" type="datetime1">
               <a:rPr lang="en-US" smtClean="0"/>
-              <a:t>3/31/2020</a:t>
+              <a:t>4/18/2020</a:t>
             </a:fld>
             <a:endParaRPr lang="en-US"/>
           </a:p>
@@ -2582,7 +2582,7 @@
           <a:p>
             <a:fld id="{0479B4C9-834B-45B6-A213-A18EC474B580}" type="datetime1">
               <a:rPr lang="en-US" smtClean="0"/>
-              <a:t>3/31/2020</a:t>
+              <a:t>4/18/2020</a:t>
             </a:fld>
             <a:endParaRPr lang="en-US"/>
           </a:p>
@@ -2723,7 +2723,7 @@
           <a:p>
             <a:fld id="{584CBDF0-C7EB-4460-AD1A-79B97C494ADD}" type="datetime1">
               <a:rPr lang="en-US" smtClean="0"/>
-              <a:t>3/31/2020</a:t>
+              <a:t>4/18/2020</a:t>
             </a:fld>
             <a:endParaRPr lang="en-US"/>
           </a:p>
@@ -2836,7 +2836,7 @@
           <a:p>
             <a:fld id="{E5BC38F8-A898-4B3B-8800-249970051374}" type="datetime1">
               <a:rPr lang="en-US" smtClean="0"/>
-              <a:t>3/31/2020</a:t>
+              <a:t>4/18/2020</a:t>
             </a:fld>
             <a:endParaRPr lang="en-US"/>
           </a:p>
@@ -3147,7 +3147,7 @@
           <a:p>
             <a:fld id="{0C224716-6D0B-44AE-BFD7-7D88CE851A8D}" type="datetime1">
               <a:rPr lang="en-US" smtClean="0"/>
-              <a:t>3/31/2020</a:t>
+              <a:t>4/18/2020</a:t>
             </a:fld>
             <a:endParaRPr lang="en-US"/>
           </a:p>
@@ -3435,7 +3435,7 @@
           <a:p>
             <a:fld id="{8F9E19C8-6751-4E8D-8A79-5D0A76412F3F}" type="datetime1">
               <a:rPr lang="en-US" smtClean="0"/>
-              <a:t>3/31/2020</a:t>
+              <a:t>4/18/2020</a:t>
             </a:fld>
             <a:endParaRPr lang="en-US"/>
           </a:p>
@@ -3676,7 +3676,7 @@
           <a:p>
             <a:fld id="{53E5F8B9-896D-4C8C-9854-853B2C8810B7}" type="datetime1">
               <a:rPr lang="en-US" smtClean="0"/>
-              <a:t>3/31/2020</a:t>
+              <a:t>4/18/2020</a:t>
             </a:fld>
             <a:endParaRPr lang="en-US"/>
           </a:p>
@@ -5961,10 +5961,10 @@
       </p:sp>
       <p:pic>
         <p:nvPicPr>
-          <p:cNvPr id="3" name="Picture 2">
-            <a:extLst>
-              <a:ext uri="{FF2B5EF4-FFF2-40B4-BE49-F238E27FC236}">
-                <a16:creationId xmlns:a16="http://schemas.microsoft.com/office/drawing/2014/main" id="{07FB9615-6AA9-4096-B8AF-CAEE073DCC6D}"/>
+          <p:cNvPr id="2" name="Picture 1">
+            <a:extLst>
+              <a:ext uri="{FF2B5EF4-FFF2-40B4-BE49-F238E27FC236}">
+                <a16:creationId xmlns:a16="http://schemas.microsoft.com/office/drawing/2014/main" id="{CFBC46F8-348C-4177-B5AD-15BE8840ADC5}"/>
               </a:ext>
             </a:extLst>
           </p:cNvPr>
@@ -5981,8 +5981,8 @@
         </p:blipFill>
         <p:spPr>
           <a:xfrm>
-            <a:off x="1023682" y="1381661"/>
-            <a:ext cx="10144636" cy="4974690"/>
+            <a:off x="916146" y="1338827"/>
+            <a:ext cx="8422869" cy="5017523"/>
           </a:xfrm>
           <a:prstGeom prst="rect">
             <a:avLst/>

</xml_diff>